<commit_message>
add Thong so thiet bi
</commit_message>
<xml_diff>
--- a/note.pptx
+++ b/note.pptx
@@ -106,6 +106,11 @@
       </a:defRPr>
     </a:lvl9pPr>
   </p:defaultTextStyle>
+  <p:extLst>
+    <p:ext uri="{EFAFB233-063F-42B5-8137-9DF3F51BA10A}">
+      <p15:sldGuideLst xmlns:p15="http://schemas.microsoft.com/office/powerpoint/2012/main"/>
+    </p:ext>
+  </p:extLst>
 </p:presentation>
 </file>
 
@@ -240,7 +245,7 @@
           <a:p>
             <a:fld id="{DCA6C425-74DC-47B3-82AE-9258EE7AF9C3}" type="datetimeFigureOut">
               <a:rPr lang="en-US" smtClean="0"/>
-              <a:t>8/5/2022</a:t>
+              <a:t>8/6/2022</a:t>
             </a:fld>
             <a:endParaRPr lang="en-US"/>
           </a:p>
@@ -410,7 +415,7 @@
           <a:p>
             <a:fld id="{DCA6C425-74DC-47B3-82AE-9258EE7AF9C3}" type="datetimeFigureOut">
               <a:rPr lang="en-US" smtClean="0"/>
-              <a:t>8/5/2022</a:t>
+              <a:t>8/6/2022</a:t>
             </a:fld>
             <a:endParaRPr lang="en-US"/>
           </a:p>
@@ -590,7 +595,7 @@
           <a:p>
             <a:fld id="{DCA6C425-74DC-47B3-82AE-9258EE7AF9C3}" type="datetimeFigureOut">
               <a:rPr lang="en-US" smtClean="0"/>
-              <a:t>8/5/2022</a:t>
+              <a:t>8/6/2022</a:t>
             </a:fld>
             <a:endParaRPr lang="en-US"/>
           </a:p>
@@ -760,7 +765,7 @@
           <a:p>
             <a:fld id="{DCA6C425-74DC-47B3-82AE-9258EE7AF9C3}" type="datetimeFigureOut">
               <a:rPr lang="en-US" smtClean="0"/>
-              <a:t>8/5/2022</a:t>
+              <a:t>8/6/2022</a:t>
             </a:fld>
             <a:endParaRPr lang="en-US"/>
           </a:p>
@@ -1006,7 +1011,7 @@
           <a:p>
             <a:fld id="{DCA6C425-74DC-47B3-82AE-9258EE7AF9C3}" type="datetimeFigureOut">
               <a:rPr lang="en-US" smtClean="0"/>
-              <a:t>8/5/2022</a:t>
+              <a:t>8/6/2022</a:t>
             </a:fld>
             <a:endParaRPr lang="en-US"/>
           </a:p>
@@ -1238,7 +1243,7 @@
           <a:p>
             <a:fld id="{DCA6C425-74DC-47B3-82AE-9258EE7AF9C3}" type="datetimeFigureOut">
               <a:rPr lang="en-US" smtClean="0"/>
-              <a:t>8/5/2022</a:t>
+              <a:t>8/6/2022</a:t>
             </a:fld>
             <a:endParaRPr lang="en-US"/>
           </a:p>
@@ -1605,7 +1610,7 @@
           <a:p>
             <a:fld id="{DCA6C425-74DC-47B3-82AE-9258EE7AF9C3}" type="datetimeFigureOut">
               <a:rPr lang="en-US" smtClean="0"/>
-              <a:t>8/5/2022</a:t>
+              <a:t>8/6/2022</a:t>
             </a:fld>
             <a:endParaRPr lang="en-US"/>
           </a:p>
@@ -1723,7 +1728,7 @@
           <a:p>
             <a:fld id="{DCA6C425-74DC-47B3-82AE-9258EE7AF9C3}" type="datetimeFigureOut">
               <a:rPr lang="en-US" smtClean="0"/>
-              <a:t>8/5/2022</a:t>
+              <a:t>8/6/2022</a:t>
             </a:fld>
             <a:endParaRPr lang="en-US"/>
           </a:p>
@@ -1818,7 +1823,7 @@
           <a:p>
             <a:fld id="{DCA6C425-74DC-47B3-82AE-9258EE7AF9C3}" type="datetimeFigureOut">
               <a:rPr lang="en-US" smtClean="0"/>
-              <a:t>8/5/2022</a:t>
+              <a:t>8/6/2022</a:t>
             </a:fld>
             <a:endParaRPr lang="en-US"/>
           </a:p>
@@ -2095,7 +2100,7 @@
           <a:p>
             <a:fld id="{DCA6C425-74DC-47B3-82AE-9258EE7AF9C3}" type="datetimeFigureOut">
               <a:rPr lang="en-US" smtClean="0"/>
-              <a:t>8/5/2022</a:t>
+              <a:t>8/6/2022</a:t>
             </a:fld>
             <a:endParaRPr lang="en-US"/>
           </a:p>
@@ -2348,7 +2353,7 @@
           <a:p>
             <a:fld id="{DCA6C425-74DC-47B3-82AE-9258EE7AF9C3}" type="datetimeFigureOut">
               <a:rPr lang="en-US" smtClean="0"/>
-              <a:t>8/5/2022</a:t>
+              <a:t>8/6/2022</a:t>
             </a:fld>
             <a:endParaRPr lang="en-US"/>
           </a:p>
@@ -2561,7 +2566,7 @@
           <a:p>
             <a:fld id="{DCA6C425-74DC-47B3-82AE-9258EE7AF9C3}" type="datetimeFigureOut">
               <a:rPr lang="en-US" smtClean="0"/>
-              <a:t>8/5/2022</a:t>
+              <a:t>8/6/2022</a:t>
             </a:fld>
             <a:endParaRPr lang="en-US"/>
           </a:p>
@@ -2974,8 +2979,8 @@
         </p:nvSpPr>
         <p:spPr>
           <a:xfrm>
-            <a:off x="209384" y="1208599"/>
-            <a:ext cx="11009906" cy="5355312"/>
+            <a:off x="451661" y="645891"/>
+            <a:ext cx="11009906" cy="5632311"/>
           </a:xfrm>
           <a:prstGeom prst="rect">
             <a:avLst/>
@@ -3040,8 +3045,19 @@
           <a:p>
             <a:r>
               <a:rPr lang="en-US" smtClean="0"/>
-              <a:t>dai luong tren luoi dien) + thay đổi lưu đồ thuật toán</a:t>
-            </a:r>
+              <a:t>dai luong tren luoi dien) + thay đổi lưu đồ thuật </a:t>
+            </a:r>
+            <a:r>
+              <a:rPr lang="en-US" smtClean="0"/>
+              <a:t>toán</a:t>
+            </a:r>
+          </a:p>
+          <a:p>
+            <a:r>
+              <a:rPr lang="en-US" smtClean="0"/>
+              <a:t>- Tài liệu tham khảo</a:t>
+            </a:r>
+            <a:endParaRPr lang="en-US" smtClean="0"/>
           </a:p>
           <a:p>
             <a:endParaRPr lang="en-US" smtClean="0"/>
@@ -3250,7 +3266,6 @@
               <a:rPr lang="en-US" smtClean="0"/>
               <a:t>Lắp đặt thiết bị như thế nào trong hệ thống nhà?</a:t>
             </a:r>
-            <a:endParaRPr lang="en-US" smtClean="0"/>
           </a:p>
         </p:txBody>
       </p:sp>

</xml_diff>